<commit_message>
Update icons and remove unused asset
Updated icon48.png, icon128.png, and icon.pptx with new versions. Removed the unused icon.png from the assets directory.
</commit_message>
<xml_diff>
--- a/assets/icon.pptx
+++ b/assets/icon.pptx
@@ -5,9 +5,10 @@
     <p:sldMasterId id="2147483648" r:id="rId1"/>
   </p:sldMasterIdLst>
   <p:sldIdLst>
-    <p:sldId id="259" r:id="rId2"/>
-    <p:sldId id="256" r:id="rId3"/>
-    <p:sldId id="258" r:id="rId4"/>
+    <p:sldId id="260" r:id="rId2"/>
+    <p:sldId id="259" r:id="rId3"/>
+    <p:sldId id="256" r:id="rId4"/>
+    <p:sldId id="258" r:id="rId5"/>
   </p:sldIdLst>
   <p:sldSz cx="12192000" cy="6858000"/>
   <p:notesSz cx="6858000" cy="9144000"/>
@@ -106,6 +107,11 @@
       </a:defRPr>
     </a:lvl9pPr>
   </p:defaultTextStyle>
+  <p:extLst>
+    <p:ext uri="{EFAFB233-063F-42B5-8137-9DF3F51BA10A}">
+      <p15:sldGuideLst xmlns:p15="http://schemas.microsoft.com/office/powerpoint/2012/main"/>
+    </p:ext>
+  </p:extLst>
 </p:presentation>
 </file>
 
@@ -256,7 +262,7 @@
           <a:p>
             <a:fld id="{829B7F27-06C3-C54C-AE4F-7BCB3CD5B869}" type="datetimeFigureOut">
               <a:rPr kumimoji="1" lang="ja-JP" altLang="en-US" smtClean="0"/>
-              <a:t>2025/12/16</a:t>
+              <a:t>2025/12/27</a:t>
             </a:fld>
             <a:endParaRPr kumimoji="1" lang="ja-JP" altLang="en-US"/>
           </a:p>
@@ -486,7 +492,7 @@
           <a:p>
             <a:fld id="{829B7F27-06C3-C54C-AE4F-7BCB3CD5B869}" type="datetimeFigureOut">
               <a:rPr kumimoji="1" lang="ja-JP" altLang="en-US" smtClean="0"/>
-              <a:t>2025/12/16</a:t>
+              <a:t>2025/12/27</a:t>
             </a:fld>
             <a:endParaRPr kumimoji="1" lang="ja-JP" altLang="en-US"/>
           </a:p>
@@ -726,7 +732,7 @@
           <a:p>
             <a:fld id="{829B7F27-06C3-C54C-AE4F-7BCB3CD5B869}" type="datetimeFigureOut">
               <a:rPr kumimoji="1" lang="ja-JP" altLang="en-US" smtClean="0"/>
-              <a:t>2025/12/16</a:t>
+              <a:t>2025/12/27</a:t>
             </a:fld>
             <a:endParaRPr kumimoji="1" lang="ja-JP" altLang="en-US"/>
           </a:p>
@@ -956,7 +962,7 @@
           <a:p>
             <a:fld id="{829B7F27-06C3-C54C-AE4F-7BCB3CD5B869}" type="datetimeFigureOut">
               <a:rPr kumimoji="1" lang="ja-JP" altLang="en-US" smtClean="0"/>
-              <a:t>2025/12/16</a:t>
+              <a:t>2025/12/27</a:t>
             </a:fld>
             <a:endParaRPr kumimoji="1" lang="ja-JP" altLang="en-US"/>
           </a:p>
@@ -1231,7 +1237,7 @@
           <a:p>
             <a:fld id="{829B7F27-06C3-C54C-AE4F-7BCB3CD5B869}" type="datetimeFigureOut">
               <a:rPr kumimoji="1" lang="ja-JP" altLang="en-US" smtClean="0"/>
-              <a:t>2025/12/16</a:t>
+              <a:t>2025/12/27</a:t>
             </a:fld>
             <a:endParaRPr kumimoji="1" lang="ja-JP" altLang="en-US"/>
           </a:p>
@@ -1560,7 +1566,7 @@
           <a:p>
             <a:fld id="{829B7F27-06C3-C54C-AE4F-7BCB3CD5B869}" type="datetimeFigureOut">
               <a:rPr kumimoji="1" lang="ja-JP" altLang="en-US" smtClean="0"/>
-              <a:t>2025/12/16</a:t>
+              <a:t>2025/12/27</a:t>
             </a:fld>
             <a:endParaRPr kumimoji="1" lang="ja-JP" altLang="en-US"/>
           </a:p>
@@ -2036,7 +2042,7 @@
           <a:p>
             <a:fld id="{829B7F27-06C3-C54C-AE4F-7BCB3CD5B869}" type="datetimeFigureOut">
               <a:rPr kumimoji="1" lang="ja-JP" altLang="en-US" smtClean="0"/>
-              <a:t>2025/12/16</a:t>
+              <a:t>2025/12/27</a:t>
             </a:fld>
             <a:endParaRPr kumimoji="1" lang="ja-JP" altLang="en-US"/>
           </a:p>
@@ -2177,7 +2183,7 @@
           <a:p>
             <a:fld id="{829B7F27-06C3-C54C-AE4F-7BCB3CD5B869}" type="datetimeFigureOut">
               <a:rPr kumimoji="1" lang="ja-JP" altLang="en-US" smtClean="0"/>
-              <a:t>2025/12/16</a:t>
+              <a:t>2025/12/27</a:t>
             </a:fld>
             <a:endParaRPr kumimoji="1" lang="ja-JP" altLang="en-US"/>
           </a:p>
@@ -2290,7 +2296,7 @@
           <a:p>
             <a:fld id="{829B7F27-06C3-C54C-AE4F-7BCB3CD5B869}" type="datetimeFigureOut">
               <a:rPr kumimoji="1" lang="ja-JP" altLang="en-US" smtClean="0"/>
-              <a:t>2025/12/16</a:t>
+              <a:t>2025/12/27</a:t>
             </a:fld>
             <a:endParaRPr kumimoji="1" lang="ja-JP" altLang="en-US"/>
           </a:p>
@@ -2633,7 +2639,7 @@
           <a:p>
             <a:fld id="{829B7F27-06C3-C54C-AE4F-7BCB3CD5B869}" type="datetimeFigureOut">
               <a:rPr kumimoji="1" lang="ja-JP" altLang="en-US" smtClean="0"/>
-              <a:t>2025/12/16</a:t>
+              <a:t>2025/12/27</a:t>
             </a:fld>
             <a:endParaRPr kumimoji="1" lang="ja-JP" altLang="en-US"/>
           </a:p>
@@ -2921,7 +2927,7 @@
           <a:p>
             <a:fld id="{829B7F27-06C3-C54C-AE4F-7BCB3CD5B869}" type="datetimeFigureOut">
               <a:rPr kumimoji="1" lang="ja-JP" altLang="en-US" smtClean="0"/>
-              <a:t>2025/12/16</a:t>
+              <a:t>2025/12/27</a:t>
             </a:fld>
             <a:endParaRPr kumimoji="1" lang="ja-JP" altLang="en-US"/>
           </a:p>
@@ -3194,7 +3200,7 @@
           <a:p>
             <a:fld id="{829B7F27-06C3-C54C-AE4F-7BCB3CD5B869}" type="datetimeFigureOut">
               <a:rPr kumimoji="1" lang="ja-JP" altLang="en-US" smtClean="0"/>
-              <a:t>2025/12/16</a:t>
+              <a:t>2025/12/27</a:t>
             </a:fld>
             <a:endParaRPr kumimoji="1" lang="ja-JP" altLang="en-US"/>
           </a:p>
@@ -3602,6 +3608,891 @@
         <p:cNvPr id="1" name="">
           <a:extLst>
             <a:ext uri="{FF2B5EF4-FFF2-40B4-BE49-F238E27FC236}">
+              <a16:creationId xmlns:a16="http://schemas.microsoft.com/office/drawing/2014/main" id="{35F781D7-B8EC-0D6B-29B9-6405FAA55485}"/>
+            </a:ext>
+          </a:extLst>
+        </p:cNvPr>
+        <p:cNvGrpSpPr/>
+        <p:nvPr/>
+      </p:nvGrpSpPr>
+      <p:grpSpPr>
+        <a:xfrm>
+          <a:off x="0" y="0"/>
+          <a:ext cx="0" cy="0"/>
+          <a:chOff x="0" y="0"/>
+          <a:chExt cx="0" cy="0"/>
+        </a:xfrm>
+      </p:grpSpPr>
+      <p:sp>
+        <p:nvSpPr>
+          <p:cNvPr id="7" name="角丸四角形 6">
+            <a:extLst>
+              <a:ext uri="{FF2B5EF4-FFF2-40B4-BE49-F238E27FC236}">
+                <a16:creationId xmlns:a16="http://schemas.microsoft.com/office/drawing/2014/main" id="{1CC4CB7F-34F2-EEB5-AAAE-19A79EE2059F}"/>
+              </a:ext>
+            </a:extLst>
+          </p:cNvPr>
+          <p:cNvSpPr/>
+          <p:nvPr/>
+        </p:nvSpPr>
+        <p:spPr>
+          <a:xfrm>
+            <a:off x="3191182" y="841421"/>
+            <a:ext cx="4521792" cy="4477709"/>
+          </a:xfrm>
+          <a:prstGeom prst="roundRect">
+            <a:avLst>
+              <a:gd name="adj" fmla="val 17483"/>
+            </a:avLst>
+          </a:prstGeom>
+          <a:solidFill>
+            <a:srgbClr val="2090E9"/>
+          </a:solidFill>
+          <a:ln w="152400">
+            <a:noFill/>
+          </a:ln>
+        </p:spPr>
+        <p:style>
+          <a:lnRef idx="2">
+            <a:schemeClr val="accent1">
+              <a:shade val="15000"/>
+            </a:schemeClr>
+          </a:lnRef>
+          <a:fillRef idx="1">
+            <a:schemeClr val="accent1"/>
+          </a:fillRef>
+          <a:effectRef idx="0">
+            <a:schemeClr val="accent1"/>
+          </a:effectRef>
+          <a:fontRef idx="minor">
+            <a:schemeClr val="lt1"/>
+          </a:fontRef>
+        </p:style>
+        <p:txBody>
+          <a:bodyPr tIns="0" bIns="72000" rtlCol="0" anchor="ctr"/>
+          <a:lstStyle/>
+          <a:p>
+            <a:pPr algn="ctr"/>
+            <a:r>
+              <a:rPr kumimoji="1" lang="en-US" altLang="ja-JP" sz="28000" b="1" dirty="0">
+                <a:latin typeface="Helvetica" pitchFamily="2" charset="0"/>
+                <a:ea typeface="MS Gothic" panose="020B0609070205080204" pitchFamily="49" charset="-128"/>
+                <a:cs typeface="FUTURA MEDIUM" panose="020B0602020204020303" pitchFamily="34" charset="-79"/>
+              </a:rPr>
+              <a:t>B</a:t>
+            </a:r>
+            <a:endParaRPr kumimoji="1" lang="ja-JP" altLang="en-US" sz="28000" b="1">
+              <a:latin typeface="Helvetica" pitchFamily="2" charset="0"/>
+              <a:ea typeface="MS Gothic" panose="020B0609070205080204" pitchFamily="49" charset="-128"/>
+              <a:cs typeface="FUTURA MEDIUM" panose="020B0602020204020303" pitchFamily="34" charset="-79"/>
+            </a:endParaRPr>
+          </a:p>
+        </p:txBody>
+      </p:sp>
+      <p:grpSp>
+        <p:nvGrpSpPr>
+          <p:cNvPr id="6" name="グループ化 5">
+            <a:extLst>
+              <a:ext uri="{FF2B5EF4-FFF2-40B4-BE49-F238E27FC236}">
+                <a16:creationId xmlns:a16="http://schemas.microsoft.com/office/drawing/2014/main" id="{2DD4A499-6B94-7555-1371-E1FF35584AF0}"/>
+              </a:ext>
+            </a:extLst>
+          </p:cNvPr>
+          <p:cNvGrpSpPr/>
+          <p:nvPr/>
+        </p:nvGrpSpPr>
+        <p:grpSpPr>
+          <a:xfrm>
+            <a:off x="2508492" y="3947532"/>
+            <a:ext cx="5887172" cy="1946589"/>
+            <a:chOff x="2225019" y="3510365"/>
+            <a:chExt cx="6663890" cy="2525272"/>
+          </a:xfrm>
+        </p:grpSpPr>
+        <p:sp>
+          <p:nvSpPr>
+            <p:cNvPr id="53" name="フリーフォーム 52">
+              <a:extLst>
+                <a:ext uri="{FF2B5EF4-FFF2-40B4-BE49-F238E27FC236}">
+                  <a16:creationId xmlns:a16="http://schemas.microsoft.com/office/drawing/2014/main" id="{23C35A85-F257-112C-20DB-932DAC19D3BC}"/>
+                </a:ext>
+              </a:extLst>
+            </p:cNvPr>
+            <p:cNvSpPr/>
+            <p:nvPr/>
+          </p:nvSpPr>
+          <p:spPr>
+            <a:xfrm>
+              <a:off x="2225019" y="3510365"/>
+              <a:ext cx="6663890" cy="2016871"/>
+            </a:xfrm>
+            <a:custGeom>
+              <a:avLst/>
+              <a:gdLst>
+                <a:gd name="csX0" fmla="*/ 0 w 5736774"/>
+                <a:gd name="csY0" fmla="*/ 429985 h 1736273"/>
+                <a:gd name="csX1" fmla="*/ 0 w 5736774"/>
+                <a:gd name="csY1" fmla="*/ 429986 h 1736273"/>
+                <a:gd name="csX2" fmla="*/ 0 w 5736774"/>
+                <a:gd name="csY2" fmla="*/ 429986 h 1736273"/>
+                <a:gd name="csX3" fmla="*/ 429986 w 5736774"/>
+                <a:gd name="csY3" fmla="*/ 0 h 1736273"/>
+                <a:gd name="csX4" fmla="*/ 5306788 w 5736774"/>
+                <a:gd name="csY4" fmla="*/ 0 h 1736273"/>
+                <a:gd name="csX5" fmla="*/ 5736774 w 5736774"/>
+                <a:gd name="csY5" fmla="*/ 429986 h 1736273"/>
+                <a:gd name="csX6" fmla="*/ 5736773 w 5736774"/>
+                <a:gd name="csY6" fmla="*/ 429986 h 1736273"/>
+                <a:gd name="csX7" fmla="*/ 5306787 w 5736774"/>
+                <a:gd name="csY7" fmla="*/ 859972 h 1736273"/>
+                <a:gd name="csX8" fmla="*/ 5097234 w 5736774"/>
+                <a:gd name="csY8" fmla="*/ 859972 h 1736273"/>
+                <a:gd name="csX9" fmla="*/ 5097234 w 5736774"/>
+                <a:gd name="csY9" fmla="*/ 1529445 h 1736273"/>
+                <a:gd name="csX10" fmla="*/ 4890406 w 5736774"/>
+                <a:gd name="csY10" fmla="*/ 1736273 h 1736273"/>
+                <a:gd name="csX11" fmla="*/ 4683578 w 5736774"/>
+                <a:gd name="csY11" fmla="*/ 1529445 h 1736273"/>
+                <a:gd name="csX12" fmla="*/ 4683578 w 5736774"/>
+                <a:gd name="csY12" fmla="*/ 859972 h 1736273"/>
+                <a:gd name="csX13" fmla="*/ 3749221 w 5736774"/>
+                <a:gd name="csY13" fmla="*/ 859972 h 1736273"/>
+                <a:gd name="csX14" fmla="*/ 3749221 w 5736774"/>
+                <a:gd name="csY14" fmla="*/ 1529445 h 1736273"/>
+                <a:gd name="csX15" fmla="*/ 3542393 w 5736774"/>
+                <a:gd name="csY15" fmla="*/ 1736273 h 1736273"/>
+                <a:gd name="csX16" fmla="*/ 3335565 w 5736774"/>
+                <a:gd name="csY16" fmla="*/ 1529445 h 1736273"/>
+                <a:gd name="csX17" fmla="*/ 3335565 w 5736774"/>
+                <a:gd name="csY17" fmla="*/ 859972 h 1736273"/>
+                <a:gd name="csX18" fmla="*/ 2401208 w 5736774"/>
+                <a:gd name="csY18" fmla="*/ 859972 h 1736273"/>
+                <a:gd name="csX19" fmla="*/ 2401208 w 5736774"/>
+                <a:gd name="csY19" fmla="*/ 1529445 h 1736273"/>
+                <a:gd name="csX20" fmla="*/ 2194380 w 5736774"/>
+                <a:gd name="csY20" fmla="*/ 1736273 h 1736273"/>
+                <a:gd name="csX21" fmla="*/ 1987552 w 5736774"/>
+                <a:gd name="csY21" fmla="*/ 1529445 h 1736273"/>
+                <a:gd name="csX22" fmla="*/ 1987552 w 5736774"/>
+                <a:gd name="csY22" fmla="*/ 859972 h 1736273"/>
+                <a:gd name="csX23" fmla="*/ 1053195 w 5736774"/>
+                <a:gd name="csY23" fmla="*/ 859971 h 1736273"/>
+                <a:gd name="csX24" fmla="*/ 1053195 w 5736774"/>
+                <a:gd name="csY24" fmla="*/ 1529445 h 1736273"/>
+                <a:gd name="csX25" fmla="*/ 846367 w 5736774"/>
+                <a:gd name="csY25" fmla="*/ 1736273 h 1736273"/>
+                <a:gd name="csX26" fmla="*/ 639539 w 5736774"/>
+                <a:gd name="csY26" fmla="*/ 1529445 h 1736273"/>
+                <a:gd name="csX27" fmla="*/ 639539 w 5736774"/>
+                <a:gd name="csY27" fmla="*/ 859971 h 1736273"/>
+                <a:gd name="csX28" fmla="*/ 429986 w 5736774"/>
+                <a:gd name="csY28" fmla="*/ 859971 h 1736273"/>
+                <a:gd name="csX29" fmla="*/ 8736 w 5736774"/>
+                <a:gd name="csY29" fmla="*/ 516643 h 1736273"/>
+                <a:gd name="csX30" fmla="*/ 0 w 5736774"/>
+                <a:gd name="csY30" fmla="*/ 429986 h 1736273"/>
+                <a:gd name="csX31" fmla="*/ 8736 w 5736774"/>
+                <a:gd name="csY31" fmla="*/ 343329 h 1736273"/>
+                <a:gd name="csX32" fmla="*/ 429986 w 5736774"/>
+                <a:gd name="csY32" fmla="*/ 0 h 1736273"/>
+              </a:gdLst>
+              <a:ahLst/>
+              <a:cxnLst>
+                <a:cxn ang="0">
+                  <a:pos x="csX0" y="csY0"/>
+                </a:cxn>
+                <a:cxn ang="0">
+                  <a:pos x="csX1" y="csY1"/>
+                </a:cxn>
+                <a:cxn ang="0">
+                  <a:pos x="csX2" y="csY2"/>
+                </a:cxn>
+                <a:cxn ang="0">
+                  <a:pos x="csX3" y="csY3"/>
+                </a:cxn>
+                <a:cxn ang="0">
+                  <a:pos x="csX4" y="csY4"/>
+                </a:cxn>
+                <a:cxn ang="0">
+                  <a:pos x="csX5" y="csY5"/>
+                </a:cxn>
+                <a:cxn ang="0">
+                  <a:pos x="csX6" y="csY6"/>
+                </a:cxn>
+                <a:cxn ang="0">
+                  <a:pos x="csX7" y="csY7"/>
+                </a:cxn>
+                <a:cxn ang="0">
+                  <a:pos x="csX8" y="csY8"/>
+                </a:cxn>
+                <a:cxn ang="0">
+                  <a:pos x="csX9" y="csY9"/>
+                </a:cxn>
+                <a:cxn ang="0">
+                  <a:pos x="csX10" y="csY10"/>
+                </a:cxn>
+                <a:cxn ang="0">
+                  <a:pos x="csX11" y="csY11"/>
+                </a:cxn>
+                <a:cxn ang="0">
+                  <a:pos x="csX12" y="csY12"/>
+                </a:cxn>
+                <a:cxn ang="0">
+                  <a:pos x="csX13" y="csY13"/>
+                </a:cxn>
+                <a:cxn ang="0">
+                  <a:pos x="csX14" y="csY14"/>
+                </a:cxn>
+                <a:cxn ang="0">
+                  <a:pos x="csX15" y="csY15"/>
+                </a:cxn>
+                <a:cxn ang="0">
+                  <a:pos x="csX16" y="csY16"/>
+                </a:cxn>
+                <a:cxn ang="0">
+                  <a:pos x="csX17" y="csY17"/>
+                </a:cxn>
+                <a:cxn ang="0">
+                  <a:pos x="csX18" y="csY18"/>
+                </a:cxn>
+                <a:cxn ang="0">
+                  <a:pos x="csX19" y="csY19"/>
+                </a:cxn>
+                <a:cxn ang="0">
+                  <a:pos x="csX20" y="csY20"/>
+                </a:cxn>
+                <a:cxn ang="0">
+                  <a:pos x="csX21" y="csY21"/>
+                </a:cxn>
+                <a:cxn ang="0">
+                  <a:pos x="csX22" y="csY22"/>
+                </a:cxn>
+                <a:cxn ang="0">
+                  <a:pos x="csX23" y="csY23"/>
+                </a:cxn>
+                <a:cxn ang="0">
+                  <a:pos x="csX24" y="csY24"/>
+                </a:cxn>
+                <a:cxn ang="0">
+                  <a:pos x="csX25" y="csY25"/>
+                </a:cxn>
+                <a:cxn ang="0">
+                  <a:pos x="csX26" y="csY26"/>
+                </a:cxn>
+                <a:cxn ang="0">
+                  <a:pos x="csX27" y="csY27"/>
+                </a:cxn>
+                <a:cxn ang="0">
+                  <a:pos x="csX28" y="csY28"/>
+                </a:cxn>
+                <a:cxn ang="0">
+                  <a:pos x="csX29" y="csY29"/>
+                </a:cxn>
+                <a:cxn ang="0">
+                  <a:pos x="csX30" y="csY30"/>
+                </a:cxn>
+                <a:cxn ang="0">
+                  <a:pos x="csX31" y="csY31"/>
+                </a:cxn>
+                <a:cxn ang="0">
+                  <a:pos x="csX32" y="csY32"/>
+                </a:cxn>
+              </a:cxnLst>
+              <a:rect l="l" t="t" r="r" b="b"/>
+              <a:pathLst>
+                <a:path w="5736774" h="1736273">
+                  <a:moveTo>
+                    <a:pt x="0" y="429985"/>
+                  </a:moveTo>
+                  <a:lnTo>
+                    <a:pt x="0" y="429986"/>
+                  </a:lnTo>
+                  <a:lnTo>
+                    <a:pt x="0" y="429986"/>
+                  </a:lnTo>
+                  <a:close/>
+                  <a:moveTo>
+                    <a:pt x="429986" y="0"/>
+                  </a:moveTo>
+                  <a:lnTo>
+                    <a:pt x="5306788" y="0"/>
+                  </a:lnTo>
+                  <a:cubicBezTo>
+                    <a:pt x="5544263" y="0"/>
+                    <a:pt x="5736774" y="192511"/>
+                    <a:pt x="5736774" y="429986"/>
+                  </a:cubicBezTo>
+                  <a:lnTo>
+                    <a:pt x="5736773" y="429986"/>
+                  </a:lnTo>
+                  <a:cubicBezTo>
+                    <a:pt x="5736773" y="667461"/>
+                    <a:pt x="5544262" y="859972"/>
+                    <a:pt x="5306787" y="859972"/>
+                  </a:cubicBezTo>
+                  <a:lnTo>
+                    <a:pt x="5097234" y="859972"/>
+                  </a:lnTo>
+                  <a:lnTo>
+                    <a:pt x="5097234" y="1529445"/>
+                  </a:lnTo>
+                  <a:cubicBezTo>
+                    <a:pt x="5097234" y="1643673"/>
+                    <a:pt x="5004634" y="1736273"/>
+                    <a:pt x="4890406" y="1736273"/>
+                  </a:cubicBezTo>
+                  <a:cubicBezTo>
+                    <a:pt x="4776178" y="1736273"/>
+                    <a:pt x="4683578" y="1643673"/>
+                    <a:pt x="4683578" y="1529445"/>
+                  </a:cubicBezTo>
+                  <a:lnTo>
+                    <a:pt x="4683578" y="859972"/>
+                  </a:lnTo>
+                  <a:lnTo>
+                    <a:pt x="3749221" y="859972"/>
+                  </a:lnTo>
+                  <a:lnTo>
+                    <a:pt x="3749221" y="1529445"/>
+                  </a:lnTo>
+                  <a:cubicBezTo>
+                    <a:pt x="3749221" y="1643673"/>
+                    <a:pt x="3656621" y="1736273"/>
+                    <a:pt x="3542393" y="1736273"/>
+                  </a:cubicBezTo>
+                  <a:cubicBezTo>
+                    <a:pt x="3428165" y="1736273"/>
+                    <a:pt x="3335565" y="1643673"/>
+                    <a:pt x="3335565" y="1529445"/>
+                  </a:cubicBezTo>
+                  <a:lnTo>
+                    <a:pt x="3335565" y="859972"/>
+                  </a:lnTo>
+                  <a:lnTo>
+                    <a:pt x="2401208" y="859972"/>
+                  </a:lnTo>
+                  <a:lnTo>
+                    <a:pt x="2401208" y="1529445"/>
+                  </a:lnTo>
+                  <a:cubicBezTo>
+                    <a:pt x="2401208" y="1643673"/>
+                    <a:pt x="2308608" y="1736273"/>
+                    <a:pt x="2194380" y="1736273"/>
+                  </a:cubicBezTo>
+                  <a:cubicBezTo>
+                    <a:pt x="2080152" y="1736273"/>
+                    <a:pt x="1987552" y="1643673"/>
+                    <a:pt x="1987552" y="1529445"/>
+                  </a:cubicBezTo>
+                  <a:lnTo>
+                    <a:pt x="1987552" y="859972"/>
+                  </a:lnTo>
+                  <a:lnTo>
+                    <a:pt x="1053195" y="859971"/>
+                  </a:lnTo>
+                  <a:lnTo>
+                    <a:pt x="1053195" y="1529445"/>
+                  </a:lnTo>
+                  <a:cubicBezTo>
+                    <a:pt x="1053195" y="1643673"/>
+                    <a:pt x="960595" y="1736273"/>
+                    <a:pt x="846367" y="1736273"/>
+                  </a:cubicBezTo>
+                  <a:cubicBezTo>
+                    <a:pt x="732139" y="1736273"/>
+                    <a:pt x="639539" y="1643673"/>
+                    <a:pt x="639539" y="1529445"/>
+                  </a:cubicBezTo>
+                  <a:lnTo>
+                    <a:pt x="639539" y="859971"/>
+                  </a:lnTo>
+                  <a:lnTo>
+                    <a:pt x="429986" y="859971"/>
+                  </a:lnTo>
+                  <a:cubicBezTo>
+                    <a:pt x="222195" y="859971"/>
+                    <a:pt x="48830" y="712580"/>
+                    <a:pt x="8736" y="516643"/>
+                  </a:cubicBezTo>
+                  <a:lnTo>
+                    <a:pt x="0" y="429986"/>
+                  </a:lnTo>
+                  <a:lnTo>
+                    <a:pt x="8736" y="343329"/>
+                  </a:lnTo>
+                  <a:cubicBezTo>
+                    <a:pt x="48830" y="147391"/>
+                    <a:pt x="222195" y="0"/>
+                    <a:pt x="429986" y="0"/>
+                  </a:cubicBezTo>
+                  <a:close/>
+                </a:path>
+              </a:pathLst>
+            </a:custGeom>
+            <a:solidFill>
+              <a:schemeClr val="accent1">
+                <a:lumMod val="50000"/>
+              </a:schemeClr>
+            </a:solidFill>
+            <a:ln>
+              <a:noFill/>
+            </a:ln>
+          </p:spPr>
+          <p:style>
+            <a:lnRef idx="2">
+              <a:schemeClr val="accent1">
+                <a:shade val="15000"/>
+              </a:schemeClr>
+            </a:lnRef>
+            <a:fillRef idx="1">
+              <a:schemeClr val="accent1"/>
+            </a:fillRef>
+            <a:effectRef idx="0">
+              <a:schemeClr val="accent1"/>
+            </a:effectRef>
+            <a:fontRef idx="minor">
+              <a:schemeClr val="lt1"/>
+            </a:fontRef>
+          </p:style>
+          <p:txBody>
+            <a:bodyPr wrap="square" rtlCol="0" anchor="ctr">
+              <a:noAutofit/>
+            </a:bodyPr>
+            <a:lstStyle/>
+            <a:p>
+              <a:pPr algn="ctr"/>
+              <a:endParaRPr kumimoji="1" lang="ja-JP" altLang="en-US"/>
+            </a:p>
+          </p:txBody>
+        </p:sp>
+        <p:sp>
+          <p:nvSpPr>
+            <p:cNvPr id="2" name="フリーフォーム 1">
+              <a:extLst>
+                <a:ext uri="{FF2B5EF4-FFF2-40B4-BE49-F238E27FC236}">
+                  <a16:creationId xmlns:a16="http://schemas.microsoft.com/office/drawing/2014/main" id="{5490B280-4B6A-ED8F-F400-427B526CCCCC}"/>
+                </a:ext>
+              </a:extLst>
+            </p:cNvPr>
+            <p:cNvSpPr/>
+            <p:nvPr/>
+          </p:nvSpPr>
+          <p:spPr>
+            <a:xfrm rot="10800000">
+              <a:off x="2225019" y="4018766"/>
+              <a:ext cx="6663890" cy="2016871"/>
+            </a:xfrm>
+            <a:custGeom>
+              <a:avLst/>
+              <a:gdLst>
+                <a:gd name="csX0" fmla="*/ 0 w 5736774"/>
+                <a:gd name="csY0" fmla="*/ 429985 h 1736273"/>
+                <a:gd name="csX1" fmla="*/ 0 w 5736774"/>
+                <a:gd name="csY1" fmla="*/ 429986 h 1736273"/>
+                <a:gd name="csX2" fmla="*/ 0 w 5736774"/>
+                <a:gd name="csY2" fmla="*/ 429986 h 1736273"/>
+                <a:gd name="csX3" fmla="*/ 429986 w 5736774"/>
+                <a:gd name="csY3" fmla="*/ 0 h 1736273"/>
+                <a:gd name="csX4" fmla="*/ 5306788 w 5736774"/>
+                <a:gd name="csY4" fmla="*/ 0 h 1736273"/>
+                <a:gd name="csX5" fmla="*/ 5736774 w 5736774"/>
+                <a:gd name="csY5" fmla="*/ 429986 h 1736273"/>
+                <a:gd name="csX6" fmla="*/ 5736773 w 5736774"/>
+                <a:gd name="csY6" fmla="*/ 429986 h 1736273"/>
+                <a:gd name="csX7" fmla="*/ 5306787 w 5736774"/>
+                <a:gd name="csY7" fmla="*/ 859972 h 1736273"/>
+                <a:gd name="csX8" fmla="*/ 5097234 w 5736774"/>
+                <a:gd name="csY8" fmla="*/ 859972 h 1736273"/>
+                <a:gd name="csX9" fmla="*/ 5097234 w 5736774"/>
+                <a:gd name="csY9" fmla="*/ 1529445 h 1736273"/>
+                <a:gd name="csX10" fmla="*/ 4890406 w 5736774"/>
+                <a:gd name="csY10" fmla="*/ 1736273 h 1736273"/>
+                <a:gd name="csX11" fmla="*/ 4683578 w 5736774"/>
+                <a:gd name="csY11" fmla="*/ 1529445 h 1736273"/>
+                <a:gd name="csX12" fmla="*/ 4683578 w 5736774"/>
+                <a:gd name="csY12" fmla="*/ 859972 h 1736273"/>
+                <a:gd name="csX13" fmla="*/ 3749221 w 5736774"/>
+                <a:gd name="csY13" fmla="*/ 859972 h 1736273"/>
+                <a:gd name="csX14" fmla="*/ 3749221 w 5736774"/>
+                <a:gd name="csY14" fmla="*/ 1529445 h 1736273"/>
+                <a:gd name="csX15" fmla="*/ 3542393 w 5736774"/>
+                <a:gd name="csY15" fmla="*/ 1736273 h 1736273"/>
+                <a:gd name="csX16" fmla="*/ 3335565 w 5736774"/>
+                <a:gd name="csY16" fmla="*/ 1529445 h 1736273"/>
+                <a:gd name="csX17" fmla="*/ 3335565 w 5736774"/>
+                <a:gd name="csY17" fmla="*/ 859972 h 1736273"/>
+                <a:gd name="csX18" fmla="*/ 2401208 w 5736774"/>
+                <a:gd name="csY18" fmla="*/ 859972 h 1736273"/>
+                <a:gd name="csX19" fmla="*/ 2401208 w 5736774"/>
+                <a:gd name="csY19" fmla="*/ 1529445 h 1736273"/>
+                <a:gd name="csX20" fmla="*/ 2194380 w 5736774"/>
+                <a:gd name="csY20" fmla="*/ 1736273 h 1736273"/>
+                <a:gd name="csX21" fmla="*/ 1987552 w 5736774"/>
+                <a:gd name="csY21" fmla="*/ 1529445 h 1736273"/>
+                <a:gd name="csX22" fmla="*/ 1987552 w 5736774"/>
+                <a:gd name="csY22" fmla="*/ 859972 h 1736273"/>
+                <a:gd name="csX23" fmla="*/ 1053195 w 5736774"/>
+                <a:gd name="csY23" fmla="*/ 859971 h 1736273"/>
+                <a:gd name="csX24" fmla="*/ 1053195 w 5736774"/>
+                <a:gd name="csY24" fmla="*/ 1529445 h 1736273"/>
+                <a:gd name="csX25" fmla="*/ 846367 w 5736774"/>
+                <a:gd name="csY25" fmla="*/ 1736273 h 1736273"/>
+                <a:gd name="csX26" fmla="*/ 639539 w 5736774"/>
+                <a:gd name="csY26" fmla="*/ 1529445 h 1736273"/>
+                <a:gd name="csX27" fmla="*/ 639539 w 5736774"/>
+                <a:gd name="csY27" fmla="*/ 859971 h 1736273"/>
+                <a:gd name="csX28" fmla="*/ 429986 w 5736774"/>
+                <a:gd name="csY28" fmla="*/ 859971 h 1736273"/>
+                <a:gd name="csX29" fmla="*/ 8736 w 5736774"/>
+                <a:gd name="csY29" fmla="*/ 516643 h 1736273"/>
+                <a:gd name="csX30" fmla="*/ 0 w 5736774"/>
+                <a:gd name="csY30" fmla="*/ 429986 h 1736273"/>
+                <a:gd name="csX31" fmla="*/ 8736 w 5736774"/>
+                <a:gd name="csY31" fmla="*/ 343329 h 1736273"/>
+                <a:gd name="csX32" fmla="*/ 429986 w 5736774"/>
+                <a:gd name="csY32" fmla="*/ 0 h 1736273"/>
+              </a:gdLst>
+              <a:ahLst/>
+              <a:cxnLst>
+                <a:cxn ang="0">
+                  <a:pos x="csX0" y="csY0"/>
+                </a:cxn>
+                <a:cxn ang="0">
+                  <a:pos x="csX1" y="csY1"/>
+                </a:cxn>
+                <a:cxn ang="0">
+                  <a:pos x="csX2" y="csY2"/>
+                </a:cxn>
+                <a:cxn ang="0">
+                  <a:pos x="csX3" y="csY3"/>
+                </a:cxn>
+                <a:cxn ang="0">
+                  <a:pos x="csX4" y="csY4"/>
+                </a:cxn>
+                <a:cxn ang="0">
+                  <a:pos x="csX5" y="csY5"/>
+                </a:cxn>
+                <a:cxn ang="0">
+                  <a:pos x="csX6" y="csY6"/>
+                </a:cxn>
+                <a:cxn ang="0">
+                  <a:pos x="csX7" y="csY7"/>
+                </a:cxn>
+                <a:cxn ang="0">
+                  <a:pos x="csX8" y="csY8"/>
+                </a:cxn>
+                <a:cxn ang="0">
+                  <a:pos x="csX9" y="csY9"/>
+                </a:cxn>
+                <a:cxn ang="0">
+                  <a:pos x="csX10" y="csY10"/>
+                </a:cxn>
+                <a:cxn ang="0">
+                  <a:pos x="csX11" y="csY11"/>
+                </a:cxn>
+                <a:cxn ang="0">
+                  <a:pos x="csX12" y="csY12"/>
+                </a:cxn>
+                <a:cxn ang="0">
+                  <a:pos x="csX13" y="csY13"/>
+                </a:cxn>
+                <a:cxn ang="0">
+                  <a:pos x="csX14" y="csY14"/>
+                </a:cxn>
+                <a:cxn ang="0">
+                  <a:pos x="csX15" y="csY15"/>
+                </a:cxn>
+                <a:cxn ang="0">
+                  <a:pos x="csX16" y="csY16"/>
+                </a:cxn>
+                <a:cxn ang="0">
+                  <a:pos x="csX17" y="csY17"/>
+                </a:cxn>
+                <a:cxn ang="0">
+                  <a:pos x="csX18" y="csY18"/>
+                </a:cxn>
+                <a:cxn ang="0">
+                  <a:pos x="csX19" y="csY19"/>
+                </a:cxn>
+                <a:cxn ang="0">
+                  <a:pos x="csX20" y="csY20"/>
+                </a:cxn>
+                <a:cxn ang="0">
+                  <a:pos x="csX21" y="csY21"/>
+                </a:cxn>
+                <a:cxn ang="0">
+                  <a:pos x="csX22" y="csY22"/>
+                </a:cxn>
+                <a:cxn ang="0">
+                  <a:pos x="csX23" y="csY23"/>
+                </a:cxn>
+                <a:cxn ang="0">
+                  <a:pos x="csX24" y="csY24"/>
+                </a:cxn>
+                <a:cxn ang="0">
+                  <a:pos x="csX25" y="csY25"/>
+                </a:cxn>
+                <a:cxn ang="0">
+                  <a:pos x="csX26" y="csY26"/>
+                </a:cxn>
+                <a:cxn ang="0">
+                  <a:pos x="csX27" y="csY27"/>
+                </a:cxn>
+                <a:cxn ang="0">
+                  <a:pos x="csX28" y="csY28"/>
+                </a:cxn>
+                <a:cxn ang="0">
+                  <a:pos x="csX29" y="csY29"/>
+                </a:cxn>
+                <a:cxn ang="0">
+                  <a:pos x="csX30" y="csY30"/>
+                </a:cxn>
+                <a:cxn ang="0">
+                  <a:pos x="csX31" y="csY31"/>
+                </a:cxn>
+                <a:cxn ang="0">
+                  <a:pos x="csX32" y="csY32"/>
+                </a:cxn>
+              </a:cxnLst>
+              <a:rect l="l" t="t" r="r" b="b"/>
+              <a:pathLst>
+                <a:path w="5736774" h="1736273">
+                  <a:moveTo>
+                    <a:pt x="0" y="429985"/>
+                  </a:moveTo>
+                  <a:lnTo>
+                    <a:pt x="0" y="429986"/>
+                  </a:lnTo>
+                  <a:lnTo>
+                    <a:pt x="0" y="429986"/>
+                  </a:lnTo>
+                  <a:close/>
+                  <a:moveTo>
+                    <a:pt x="429986" y="0"/>
+                  </a:moveTo>
+                  <a:lnTo>
+                    <a:pt x="5306788" y="0"/>
+                  </a:lnTo>
+                  <a:cubicBezTo>
+                    <a:pt x="5544263" y="0"/>
+                    <a:pt x="5736774" y="192511"/>
+                    <a:pt x="5736774" y="429986"/>
+                  </a:cubicBezTo>
+                  <a:lnTo>
+                    <a:pt x="5736773" y="429986"/>
+                  </a:lnTo>
+                  <a:cubicBezTo>
+                    <a:pt x="5736773" y="667461"/>
+                    <a:pt x="5544262" y="859972"/>
+                    <a:pt x="5306787" y="859972"/>
+                  </a:cubicBezTo>
+                  <a:lnTo>
+                    <a:pt x="5097234" y="859972"/>
+                  </a:lnTo>
+                  <a:lnTo>
+                    <a:pt x="5097234" y="1529445"/>
+                  </a:lnTo>
+                  <a:cubicBezTo>
+                    <a:pt x="5097234" y="1643673"/>
+                    <a:pt x="5004634" y="1736273"/>
+                    <a:pt x="4890406" y="1736273"/>
+                  </a:cubicBezTo>
+                  <a:cubicBezTo>
+                    <a:pt x="4776178" y="1736273"/>
+                    <a:pt x="4683578" y="1643673"/>
+                    <a:pt x="4683578" y="1529445"/>
+                  </a:cubicBezTo>
+                  <a:lnTo>
+                    <a:pt x="4683578" y="859972"/>
+                  </a:lnTo>
+                  <a:lnTo>
+                    <a:pt x="3749221" y="859972"/>
+                  </a:lnTo>
+                  <a:lnTo>
+                    <a:pt x="3749221" y="1529445"/>
+                  </a:lnTo>
+                  <a:cubicBezTo>
+                    <a:pt x="3749221" y="1643673"/>
+                    <a:pt x="3656621" y="1736273"/>
+                    <a:pt x="3542393" y="1736273"/>
+                  </a:cubicBezTo>
+                  <a:cubicBezTo>
+                    <a:pt x="3428165" y="1736273"/>
+                    <a:pt x="3335565" y="1643673"/>
+                    <a:pt x="3335565" y="1529445"/>
+                  </a:cubicBezTo>
+                  <a:lnTo>
+                    <a:pt x="3335565" y="859972"/>
+                  </a:lnTo>
+                  <a:lnTo>
+                    <a:pt x="2401208" y="859972"/>
+                  </a:lnTo>
+                  <a:lnTo>
+                    <a:pt x="2401208" y="1529445"/>
+                  </a:lnTo>
+                  <a:cubicBezTo>
+                    <a:pt x="2401208" y="1643673"/>
+                    <a:pt x="2308608" y="1736273"/>
+                    <a:pt x="2194380" y="1736273"/>
+                  </a:cubicBezTo>
+                  <a:cubicBezTo>
+                    <a:pt x="2080152" y="1736273"/>
+                    <a:pt x="1987552" y="1643673"/>
+                    <a:pt x="1987552" y="1529445"/>
+                  </a:cubicBezTo>
+                  <a:lnTo>
+                    <a:pt x="1987552" y="859972"/>
+                  </a:lnTo>
+                  <a:lnTo>
+                    <a:pt x="1053195" y="859971"/>
+                  </a:lnTo>
+                  <a:lnTo>
+                    <a:pt x="1053195" y="1529445"/>
+                  </a:lnTo>
+                  <a:cubicBezTo>
+                    <a:pt x="1053195" y="1643673"/>
+                    <a:pt x="960595" y="1736273"/>
+                    <a:pt x="846367" y="1736273"/>
+                  </a:cubicBezTo>
+                  <a:cubicBezTo>
+                    <a:pt x="732139" y="1736273"/>
+                    <a:pt x="639539" y="1643673"/>
+                    <a:pt x="639539" y="1529445"/>
+                  </a:cubicBezTo>
+                  <a:lnTo>
+                    <a:pt x="639539" y="859971"/>
+                  </a:lnTo>
+                  <a:lnTo>
+                    <a:pt x="429986" y="859971"/>
+                  </a:lnTo>
+                  <a:cubicBezTo>
+                    <a:pt x="222195" y="859971"/>
+                    <a:pt x="48830" y="712580"/>
+                    <a:pt x="8736" y="516643"/>
+                  </a:cubicBezTo>
+                  <a:lnTo>
+                    <a:pt x="0" y="429986"/>
+                  </a:lnTo>
+                  <a:lnTo>
+                    <a:pt x="8736" y="343329"/>
+                  </a:lnTo>
+                  <a:cubicBezTo>
+                    <a:pt x="48830" y="147391"/>
+                    <a:pt x="222195" y="0"/>
+                    <a:pt x="429986" y="0"/>
+                  </a:cubicBezTo>
+                  <a:close/>
+                </a:path>
+              </a:pathLst>
+            </a:custGeom>
+            <a:solidFill>
+              <a:schemeClr val="accent1">
+                <a:lumMod val="50000"/>
+              </a:schemeClr>
+            </a:solidFill>
+            <a:ln>
+              <a:noFill/>
+            </a:ln>
+          </p:spPr>
+          <p:style>
+            <a:lnRef idx="2">
+              <a:schemeClr val="accent1">
+                <a:shade val="15000"/>
+              </a:schemeClr>
+            </a:lnRef>
+            <a:fillRef idx="1">
+              <a:schemeClr val="accent1"/>
+            </a:fillRef>
+            <a:effectRef idx="0">
+              <a:schemeClr val="accent1"/>
+            </a:effectRef>
+            <a:fontRef idx="minor">
+              <a:schemeClr val="lt1"/>
+            </a:fontRef>
+          </p:style>
+          <p:txBody>
+            <a:bodyPr wrap="square" rtlCol="0" anchor="ctr">
+              <a:noAutofit/>
+            </a:bodyPr>
+            <a:lstStyle/>
+            <a:p>
+              <a:pPr algn="ctr"/>
+              <a:endParaRPr kumimoji="1" lang="ja-JP" altLang="en-US"/>
+            </a:p>
+          </p:txBody>
+        </p:sp>
+      </p:grpSp>
+      <p:sp>
+        <p:nvSpPr>
+          <p:cNvPr id="3" name="正方形/長方形 2">
+            <a:extLst>
+              <a:ext uri="{FF2B5EF4-FFF2-40B4-BE49-F238E27FC236}">
+                <a16:creationId xmlns:a16="http://schemas.microsoft.com/office/drawing/2014/main" id="{437E7CD8-C49F-A785-762E-5F3C7D562EF7}"/>
+              </a:ext>
+            </a:extLst>
+          </p:cNvPr>
+          <p:cNvSpPr/>
+          <p:nvPr/>
+        </p:nvSpPr>
+        <p:spPr>
+          <a:xfrm>
+            <a:off x="2416317" y="119743"/>
+            <a:ext cx="6049750" cy="6049750"/>
+          </a:xfrm>
+          <a:prstGeom prst="rect">
+            <a:avLst/>
+          </a:prstGeom>
+          <a:noFill/>
+          <a:ln>
+            <a:noFill/>
+          </a:ln>
+        </p:spPr>
+        <p:style>
+          <a:lnRef idx="2">
+            <a:schemeClr val="accent1">
+              <a:shade val="15000"/>
+            </a:schemeClr>
+          </a:lnRef>
+          <a:fillRef idx="1">
+            <a:schemeClr val="accent1"/>
+          </a:fillRef>
+          <a:effectRef idx="0">
+            <a:schemeClr val="accent1"/>
+          </a:effectRef>
+          <a:fontRef idx="minor">
+            <a:schemeClr val="lt1"/>
+          </a:fontRef>
+        </p:style>
+        <p:txBody>
+          <a:bodyPr rtlCol="0" anchor="ctr"/>
+          <a:lstStyle/>
+          <a:p>
+            <a:pPr algn="ctr"/>
+            <a:endParaRPr kumimoji="1" lang="ja-JP" altLang="en-US"/>
+          </a:p>
+        </p:txBody>
+      </p:sp>
+    </p:spTree>
+    <p:extLst>
+      <p:ext uri="{BB962C8B-B14F-4D97-AF65-F5344CB8AC3E}">
+        <p14:creationId xmlns:p14="http://schemas.microsoft.com/office/powerpoint/2010/main" val="1210549698"/>
+      </p:ext>
+    </p:extLst>
+  </p:cSld>
+  <p:clrMapOvr>
+    <a:masterClrMapping/>
+  </p:clrMapOvr>
+</p:sld>
+</file>
+
+<file path=ppt/slides/slide2.xml><?xml version="1.0" encoding="utf-8"?>
+<p:sld xmlns:a="http://schemas.openxmlformats.org/drawingml/2006/main" xmlns:r="http://schemas.openxmlformats.org/officeDocument/2006/relationships" xmlns:p="http://schemas.openxmlformats.org/presentationml/2006/main">
+  <p:cSld>
+    <p:spTree>
+      <p:nvGrpSpPr>
+        <p:cNvPr id="1" name="">
+          <a:extLst>
+            <a:ext uri="{FF2B5EF4-FFF2-40B4-BE49-F238E27FC236}">
               <a16:creationId xmlns:a16="http://schemas.microsoft.com/office/drawing/2014/main" id="{C499DB73-FF5A-8963-779A-345CB979AE12}"/>
             </a:ext>
           </a:extLst>
@@ -4476,7 +5367,7 @@
 </p:sld>
 </file>
 
-<file path=ppt/slides/slide2.xml><?xml version="1.0" encoding="utf-8"?>
+<file path=ppt/slides/slide3.xml><?xml version="1.0" encoding="utf-8"?>
 <p:sld xmlns:a="http://schemas.openxmlformats.org/drawingml/2006/main" xmlns:r="http://schemas.openxmlformats.org/officeDocument/2006/relationships" xmlns:p="http://schemas.openxmlformats.org/presentationml/2006/main">
   <p:cSld>
     <p:spTree>
@@ -5083,7 +5974,7 @@
 </p:sld>
 </file>
 
-<file path=ppt/slides/slide3.xml><?xml version="1.0" encoding="utf-8"?>
+<file path=ppt/slides/slide4.xml><?xml version="1.0" encoding="utf-8"?>
 <p:sld xmlns:a="http://schemas.openxmlformats.org/drawingml/2006/main" xmlns:r="http://schemas.openxmlformats.org/officeDocument/2006/relationships" xmlns:p="http://schemas.openxmlformats.org/presentationml/2006/main">
   <p:cSld>
     <p:spTree>

</xml_diff>